<commit_message>
Updated intro and summary text. Added extra figure text to 'models' figure.
</commit_message>
<xml_diff>
--- a/poster/uffe_axel_vae_poster.ppt.pptx
+++ b/poster/uffe_axel_vae_poster.ppt.pptx
@@ -12412,34 +12412,6 @@
           <a:chExt cx="0" cy="0"/>
         </a:xfrm>
       </p:grpSpPr>
-      <p:pic>
-        <p:nvPicPr>
-          <p:cNvPr id="91" name="Google Shape;91;p13"/>
-          <p:cNvPicPr preferRelativeResize="0"/>
-          <p:nvPr/>
-        </p:nvPicPr>
-        <p:blipFill>
-          <a:blip r:embed="rId3">
-            <a:alphaModFix/>
-          </a:blip>
-          <a:stretch>
-            <a:fillRect/>
-          </a:stretch>
-        </p:blipFill>
-        <p:spPr>
-          <a:xfrm>
-            <a:off x="30901967" y="17586030"/>
-            <a:ext cx="2278438" cy="3300059"/>
-          </a:xfrm>
-          <a:prstGeom prst="rect">
-            <a:avLst/>
-          </a:prstGeom>
-          <a:noFill/>
-          <a:ln>
-            <a:noFill/>
-          </a:ln>
-        </p:spPr>
-      </p:pic>
       <p:sp>
         <p:nvSpPr>
           <p:cNvPr id="92" name="Google Shape;92;p13"/>
@@ -12604,7 +12576,7 @@
         </p:nvSpPr>
         <p:spPr>
           <a:xfrm>
-            <a:off x="13359878" y="1983869"/>
+            <a:off x="13093178" y="2151846"/>
             <a:ext cx="3207758" cy="650333"/>
           </a:xfrm>
           <a:prstGeom prst="rect">
@@ -12642,88 +12614,6 @@
           </a:p>
         </p:txBody>
       </p:sp>
-      <p:cxnSp>
-        <p:nvCxnSpPr>
-          <p:cNvPr id="127" name="Google Shape;127;p13"/>
-          <p:cNvCxnSpPr>
-            <a:cxnSpLocks/>
-          </p:cNvCxnSpPr>
-          <p:nvPr/>
-        </p:nvCxnSpPr>
-        <p:spPr>
-          <a:xfrm>
-            <a:off x="32872200" y="12067161"/>
-            <a:ext cx="0" cy="4010654"/>
-          </a:xfrm>
-          <a:prstGeom prst="straightConnector1">
-            <a:avLst/>
-          </a:prstGeom>
-          <a:noFill/>
-          <a:ln w="38100" cap="flat" cmpd="sng">
-            <a:solidFill>
-              <a:srgbClr val="BF2B36"/>
-            </a:solidFill>
-            <a:prstDash val="solid"/>
-            <a:round/>
-            <a:headEnd type="none" w="med" len="med"/>
-            <a:tailEnd type="none" w="med" len="med"/>
-          </a:ln>
-        </p:spPr>
-      </p:cxnSp>
-      <p:cxnSp>
-        <p:nvCxnSpPr>
-          <p:cNvPr id="128" name="Google Shape;128;p13"/>
-          <p:cNvCxnSpPr>
-            <a:cxnSpLocks/>
-          </p:cNvCxnSpPr>
-          <p:nvPr/>
-        </p:nvCxnSpPr>
-        <p:spPr>
-          <a:xfrm>
-            <a:off x="32041186" y="6732365"/>
-            <a:ext cx="0" cy="9202232"/>
-          </a:xfrm>
-          <a:prstGeom prst="straightConnector1">
-            <a:avLst/>
-          </a:prstGeom>
-          <a:noFill/>
-          <a:ln w="38100" cap="flat" cmpd="sng">
-            <a:solidFill>
-              <a:srgbClr val="BF2B36"/>
-            </a:solidFill>
-            <a:prstDash val="solid"/>
-            <a:round/>
-            <a:headEnd type="none" w="med" len="med"/>
-            <a:tailEnd type="none" w="med" len="med"/>
-          </a:ln>
-        </p:spPr>
-      </p:cxnSp>
-      <p:cxnSp>
-        <p:nvCxnSpPr>
-          <p:cNvPr id="129" name="Google Shape;129;p13"/>
-          <p:cNvCxnSpPr/>
-          <p:nvPr/>
-        </p:nvCxnSpPr>
-        <p:spPr>
-          <a:xfrm>
-            <a:off x="31274036" y="9547050"/>
-            <a:ext cx="0" cy="7318460"/>
-          </a:xfrm>
-          <a:prstGeom prst="straightConnector1">
-            <a:avLst/>
-          </a:prstGeom>
-          <a:noFill/>
-          <a:ln w="38100" cap="flat" cmpd="sng">
-            <a:solidFill>
-              <a:srgbClr val="BF2B36"/>
-            </a:solidFill>
-            <a:prstDash val="solid"/>
-            <a:round/>
-            <a:headEnd type="none" w="med" len="med"/>
-            <a:tailEnd type="none" w="med" len="med"/>
-          </a:ln>
-        </p:spPr>
-      </p:cxnSp>
       <p:sp>
         <p:nvSpPr>
           <p:cNvPr id="144" name="Google Shape;144;p13"/>
@@ -12968,7 +12858,7 @@
         </p:nvSpPr>
         <p:spPr>
           <a:xfrm>
-            <a:off x="11530732" y="9748131"/>
+            <a:off x="12746628" y="8235636"/>
             <a:ext cx="4587825" cy="650333"/>
           </a:xfrm>
           <a:prstGeom prst="rect">
@@ -12996,7 +12886,7 @@
                   <a:schemeClr val="bg1"/>
                 </a:solidFill>
               </a:rPr>
-              <a:t>Learnings</a:t>
+              <a:t>Summary</a:t>
             </a:r>
             <a:endParaRPr sz="3390" b="1" dirty="0">
               <a:solidFill>
@@ -13125,7 +13015,7 @@
           <p:nvPr/>
         </p:nvPicPr>
         <p:blipFill>
-          <a:blip r:embed="rId4"/>
+          <a:blip r:embed="rId3"/>
           <a:stretch>
             <a:fillRect/>
           </a:stretch>
@@ -13155,7 +13045,7 @@
           <p:nvPr/>
         </p:nvPicPr>
         <p:blipFill>
-          <a:blip r:embed="rId5"/>
+          <a:blip r:embed="rId4"/>
           <a:stretch>
             <a:fillRect/>
           </a:stretch>
@@ -13185,7 +13075,7 @@
           <p:nvPr/>
         </p:nvPicPr>
         <p:blipFill>
-          <a:blip r:embed="rId6"/>
+          <a:blip r:embed="rId5"/>
           <a:stretch>
             <a:fillRect/>
           </a:stretch>
@@ -13208,8 +13098,8 @@
         </p:nvSpPr>
         <p:spPr>
           <a:xfrm>
-            <a:off x="9586691" y="2633065"/>
-            <a:ext cx="11084223" cy="3003023"/>
+            <a:off x="9421645" y="2845633"/>
+            <a:ext cx="10504655" cy="4788492"/>
           </a:xfrm>
           <a:prstGeom prst="rect">
             <a:avLst/>
@@ -13233,7 +13123,7 @@
             </a:pPr>
             <a:r>
               <a:rPr lang="en-US" sz="1695" dirty="0"/>
-              <a:t>Based on the article by Kingma et al. [1] we have built two different classifiers based on VAE’s, where the VAE part enables us to train the model on non-labelled data. These are then compared to a classical FF model.</a:t>
+              <a:t>Based on the article by Kingma et al. [1] we are presenting two different classifiers based on VAE’s, where the VAE part enables us to train the model on non-labelled data. As we both train on labelled/supervised and on unlabeled/unsupervised, it is called semi-supervised learning. These VAE classifiers are then compared to a classical FF model which can only be trained on labelled data.</a:t>
             </a:r>
           </a:p>
           <a:p>
@@ -13254,7 +13144,7 @@
             </a:pPr>
             <a:r>
               <a:rPr lang="en-US" sz="1695" dirty="0"/>
-              <a:t>M1: VAE + classifier using the much smaller latent space instead of the full image</a:t>
+              <a:t>M1: VAE + classifier that is using the much smaller latent space instead of the full image</a:t>
             </a:r>
           </a:p>
           <a:p>
@@ -13266,7 +13156,7 @@
             </a:pPr>
             <a:r>
               <a:rPr lang="en-US" sz="1695" dirty="0"/>
-              <a:t>M2: VAE where the continuous z latent space is augmented with a discreet y class variable, the network generating the p(</a:t>
+              <a:t>M2: VAE where the continuous z latent space is augmented with a discreet y class variable. The network generating the p(</a:t>
             </a:r>
             <a:r>
               <a:rPr lang="en-US" sz="1695" dirty="0" err="1"/>
@@ -13284,6 +13174,18 @@
               </a:buClr>
               <a:buSzPts val="1100"/>
             </a:pPr>
+            <a:r>
+              <a:rPr lang="en-US" sz="1695" dirty="0"/>
+              <a:t>FF: a reference classifier used for comparison. It has the same number of weights as the parts of M1 and M2 that are used for classification.</a:t>
+            </a:r>
+          </a:p>
+          <a:p>
+            <a:pPr>
+              <a:buClr>
+                <a:schemeClr val="dk1"/>
+              </a:buClr>
+              <a:buSzPts val="1100"/>
+            </a:pPr>
             <a:endParaRPr lang="en-US" sz="1695" dirty="0"/>
           </a:p>
           <a:p>
@@ -13295,7 +13197,7 @@
             </a:pPr>
             <a:r>
               <a:rPr lang="en-US" sz="1695" dirty="0"/>
-              <a:t>The M2 model has the interesting property that is enables style transfer: with given input x, one can hold z and vary y, see picture.</a:t>
+              <a:t>The M2 model has the interesting property that is enables style transfer: with given input x, one can hold z and vary y, and get digit pictures of other numbers, that have a style like the reference picture, see lower right corner.</a:t>
             </a:r>
           </a:p>
           <a:p>
@@ -13336,7 +13238,7 @@
           <p:nvPr/>
         </p:nvPicPr>
         <p:blipFill>
-          <a:blip r:embed="rId7"/>
+          <a:blip r:embed="rId6"/>
           <a:stretch>
             <a:fillRect/>
           </a:stretch>
@@ -13366,7 +13268,7 @@
           <p:nvPr/>
         </p:nvPicPr>
         <p:blipFill>
-          <a:blip r:embed="rId8"/>
+          <a:blip r:embed="rId7"/>
           <a:stretch>
             <a:fillRect/>
           </a:stretch>
@@ -13396,7 +13298,7 @@
           <p:nvPr/>
         </p:nvPicPr>
         <p:blipFill>
-          <a:blip r:embed="rId9"/>
+          <a:blip r:embed="rId8"/>
           <a:stretch>
             <a:fillRect/>
           </a:stretch>
@@ -13426,7 +13328,7 @@
           <p:nvPr/>
         </p:nvPicPr>
         <p:blipFill>
-          <a:blip r:embed="rId10"/>
+          <a:blip r:embed="rId9"/>
           <a:stretch>
             <a:fillRect/>
           </a:stretch>
@@ -13456,7 +13358,7 @@
           <p:nvPr/>
         </p:nvPicPr>
         <p:blipFill>
-          <a:blip r:embed="rId11"/>
+          <a:blip r:embed="rId10"/>
           <a:stretch>
             <a:fillRect/>
           </a:stretch>
@@ -13486,7 +13388,7 @@
           <p:nvPr/>
         </p:nvPicPr>
         <p:blipFill>
-          <a:blip r:embed="rId12"/>
+          <a:blip r:embed="rId11"/>
           <a:stretch>
             <a:fillRect/>
           </a:stretch>
@@ -13554,7 +13456,7 @@
           <p:nvPr/>
         </p:nvPicPr>
         <p:blipFill>
-          <a:blip r:embed="rId13"/>
+          <a:blip r:embed="rId12"/>
           <a:stretch>
             <a:fillRect/>
           </a:stretch>
@@ -13584,7 +13486,7 @@
           <p:nvPr/>
         </p:nvPicPr>
         <p:blipFill>
-          <a:blip r:embed="rId14"/>
+          <a:blip r:embed="rId13"/>
           <a:stretch>
             <a:fillRect/>
           </a:stretch>
@@ -13770,7 +13672,7 @@
           <p:nvPr/>
         </p:nvPicPr>
         <p:blipFill>
-          <a:blip r:embed="rId15"/>
+          <a:blip r:embed="rId14"/>
           <a:stretch>
             <a:fillRect/>
           </a:stretch>
@@ -13800,7 +13702,7 @@
           <p:nvPr/>
         </p:nvPicPr>
         <p:blipFill>
-          <a:blip r:embed="rId16"/>
+          <a:blip r:embed="rId15"/>
           <a:stretch>
             <a:fillRect/>
           </a:stretch>
@@ -13830,7 +13732,7 @@
           <p:nvPr/>
         </p:nvPicPr>
         <p:blipFill>
-          <a:blip r:embed="rId17"/>
+          <a:blip r:embed="rId16"/>
           <a:stretch>
             <a:fillRect/>
           </a:stretch>
@@ -14239,7 +14141,7 @@
                     <a:lstStyle/>
                     <a:p>
                       <a:r>
-                        <a:rPr lang="en-US" u="sng"/>
+                        <a:rPr lang="en-US" u="sng" dirty="0"/>
                         <a:t>Encoder:</a:t>
                       </a:r>
                     </a:p>
@@ -14248,7 +14150,7 @@
                         <a:buNone/>
                       </a:pPr>
                       <a:r>
-                        <a:rPr lang="en-US"/>
+                        <a:rPr lang="en-US" dirty="0"/>
                         <a:t>784 – 450 – 250 – 100 – 100</a:t>
                       </a:r>
                     </a:p>
@@ -14257,27 +14159,25 @@
                         <a:buNone/>
                       </a:pPr>
                       <a:r>
-                        <a:rPr lang="en-US" u="sng"/>
+                        <a:rPr lang="en-US" u="sng" dirty="0"/>
                         <a:t>Classifier:</a:t>
                       </a:r>
-                      <a:endParaRPr lang="en-US" u="sng" dirty="0"/>
                     </a:p>
                     <a:p>
                       <a:pPr lvl="0">
                         <a:buNone/>
                       </a:pPr>
                       <a:r>
-                        <a:rPr lang="en-US"/>
+                        <a:rPr lang="en-US" dirty="0"/>
                         <a:t>100 – 100 – 80 – 10 </a:t>
                       </a:r>
-                      <a:endParaRPr lang="en-US" dirty="0"/>
                     </a:p>
                     <a:p>
                       <a:pPr lvl="0">
                         <a:buNone/>
                       </a:pPr>
                       <a:r>
-                        <a:rPr lang="en-US" u="sng"/>
+                        <a:rPr lang="en-US" u="sng" dirty="0"/>
                         <a:t>Decoder:</a:t>
                       </a:r>
                     </a:p>
@@ -14286,10 +14186,10 @@
                         <a:buNone/>
                       </a:pPr>
                       <a:r>
-                        <a:rPr lang="en-US"/>
+                        <a:rPr lang="en-US" dirty="0"/>
                         <a:t>50 – 128 – 256 – 512 - 784</a:t>
                       </a:r>
-                      <a:endParaRPr lang="en-US" sz="1000" b="0" i="0" u="none" strike="noStrike" noProof="0">
+                      <a:endParaRPr lang="en-US" sz="1000" b="0" i="0" u="none" strike="noStrike" noProof="0" dirty="0">
                         <a:latin typeface="Arial"/>
                       </a:endParaRPr>
                     </a:p>
@@ -14460,12 +14360,12 @@
                         <a:buNone/>
                       </a:pPr>
                       <a:r>
-                        <a:rPr lang="en-US" sz="1000" b="0" i="0" u="none" strike="noStrike" noProof="0">
+                        <a:rPr lang="en-US" sz="1000" b="0" i="0" u="none" strike="noStrike" noProof="0" dirty="0">
                           <a:latin typeface="Arial"/>
                         </a:rPr>
                         <a:t>996800</a:t>
                       </a:r>
-                      <a:endParaRPr lang="en-US"/>
+                      <a:endParaRPr lang="en-US" dirty="0"/>
                     </a:p>
                   </a:txBody>
                   <a:tcPr anchor="ctr"/>
@@ -14512,10 +14412,17 @@
           <a:lstStyle/>
           <a:p>
             <a:r>
-              <a:rPr lang="en-US" sz="1000" i="1"/>
-              <a:t>Modelling of the various network components.</a:t>
+              <a:rPr lang="en-US" sz="1000" i="1" dirty="0"/>
+              <a:t>Modelling of the various network components. All sub networks are FCFF, using </a:t>
             </a:r>
-            <a:endParaRPr lang="en-US" sz="1000" i="1" dirty="0"/>
+            <a:r>
+              <a:rPr lang="en-US" sz="1000" i="1" dirty="0" err="1"/>
+              <a:t>ReLU</a:t>
+            </a:r>
+            <a:r>
+              <a:rPr lang="en-US" sz="1000" i="1" dirty="0"/>
+              <a:t> activation function in the hidden layers. Sigmoid is used as activation function in the output layer of FF and M1 classifier.</a:t>
+            </a:r>
           </a:p>
         </p:txBody>
       </p:sp>
@@ -14534,7 +14441,7 @@
           <p:nvPr/>
         </p:nvPicPr>
         <p:blipFill>
-          <a:blip r:embed="rId18"/>
+          <a:blip r:embed="rId17"/>
           <a:stretch>
             <a:fillRect/>
           </a:stretch>
@@ -14549,6 +14456,233 @@
           </a:prstGeom>
         </p:spPr>
       </p:pic>
+      <p:sp>
+        <p:nvSpPr>
+          <p:cNvPr id="13" name="Rectangle 12">
+            <a:extLst>
+              <a:ext uri="{FF2B5EF4-FFF2-40B4-BE49-F238E27FC236}">
+                <a16:creationId xmlns:a16="http://schemas.microsoft.com/office/drawing/2014/main" id="{7E4B3C81-B691-4187-852F-5C1995EA64D1}"/>
+              </a:ext>
+            </a:extLst>
+          </p:cNvPr>
+          <p:cNvSpPr/>
+          <p:nvPr/>
+        </p:nvSpPr>
+        <p:spPr>
+          <a:xfrm>
+            <a:off x="9401775" y="9172708"/>
+            <a:ext cx="10120695" cy="5324535"/>
+          </a:xfrm>
+          <a:prstGeom prst="rect">
+            <a:avLst/>
+          </a:prstGeom>
+        </p:spPr>
+        <p:txBody>
+          <a:bodyPr wrap="square">
+            <a:spAutoFit/>
+          </a:bodyPr>
+          <a:lstStyle/>
+          <a:p>
+            <a:pPr>
+              <a:buClr>
+                <a:schemeClr val="dk1"/>
+              </a:buClr>
+              <a:buSzPts val="1100"/>
+            </a:pPr>
+            <a:r>
+              <a:rPr lang="en-US" sz="1700" dirty="0"/>
+              <a:t>With just 100 labelled training data, and 40k unlabeled, we achieved 94% accuracy on the MNIST test set using the M2 VAE classifier, and thus substantially beating an FF classifier having the same size of weights, which could only achieve 73% accuracy.</a:t>
+            </a:r>
+          </a:p>
+          <a:p>
+            <a:pPr>
+              <a:buClr>
+                <a:schemeClr val="dk1"/>
+              </a:buClr>
+              <a:buSzPts val="1100"/>
+            </a:pPr>
+            <a:endParaRPr lang="en-US" sz="1700" dirty="0"/>
+          </a:p>
+          <a:p>
+            <a:pPr>
+              <a:buClr>
+                <a:schemeClr val="dk1"/>
+              </a:buClr>
+              <a:buSzPts val="1100"/>
+            </a:pPr>
+            <a:r>
+              <a:rPr lang="en-US" sz="1700" dirty="0"/>
+              <a:t>Our focus was getting M1 &amp; M2 to work and therefore only did limited experimentation with the hyper parameters of the internal neural networks. These are all using FFNN, </a:t>
+            </a:r>
+            <a:r>
+              <a:rPr lang="en-US" sz="1700" dirty="0" err="1"/>
+              <a:t>ReLU</a:t>
+            </a:r>
+            <a:r>
+              <a:rPr lang="en-US" sz="1700" dirty="0"/>
+              <a:t> &amp; BatchNorm1d.</a:t>
+            </a:r>
+          </a:p>
+          <a:p>
+            <a:pPr>
+              <a:buClr>
+                <a:schemeClr val="dk1"/>
+              </a:buClr>
+              <a:buSzPts val="1100"/>
+            </a:pPr>
+            <a:endParaRPr lang="en-US" sz="1700" dirty="0"/>
+          </a:p>
+          <a:p>
+            <a:pPr>
+              <a:buClr>
+                <a:schemeClr val="dk1"/>
+              </a:buClr>
+              <a:buSzPts val="1100"/>
+            </a:pPr>
+            <a:r>
+              <a:rPr lang="en-US" sz="1700" dirty="0"/>
+              <a:t>We fell into quite some </a:t>
+            </a:r>
+            <a:r>
+              <a:rPr lang="en-US" sz="1700" dirty="0" err="1"/>
+              <a:t>PyTorch</a:t>
+            </a:r>
+            <a:r>
+              <a:rPr lang="en-US" sz="1700" dirty="0"/>
+              <a:t> and model-building bumps during our journey. Especially M2 was tricky to get to work. Some of the pain points:</a:t>
+            </a:r>
+          </a:p>
+          <a:p>
+            <a:pPr marL="285750" indent="-285750">
+              <a:buClr>
+                <a:schemeClr val="dk1"/>
+              </a:buClr>
+              <a:buSzPts val="1100"/>
+              <a:buFont typeface="Wingdings" panose="05000000000000000000" pitchFamily="2" charset="2"/>
+              <a:buChar char="q"/>
+            </a:pPr>
+            <a:r>
+              <a:rPr lang="en-US" sz="1700" dirty="0"/>
+              <a:t>Wrongly having </a:t>
+            </a:r>
+            <a:r>
+              <a:rPr lang="en-US" sz="1700" dirty="0" err="1"/>
+              <a:t>ReLU</a:t>
+            </a:r>
+            <a:r>
+              <a:rPr lang="en-US" sz="1700" dirty="0"/>
+              <a:t> activation function on the network calculating the posterior </a:t>
+            </a:r>
+            <a:r>
+              <a:rPr lang="en-US" sz="1700" dirty="0" err="1"/>
+              <a:t>my,sigma</a:t>
+            </a:r>
+            <a:endParaRPr lang="en-US" sz="1700" dirty="0"/>
+          </a:p>
+          <a:p>
+            <a:pPr marL="285750" indent="-285750">
+              <a:buClr>
+                <a:schemeClr val="dk1"/>
+              </a:buClr>
+              <a:buSzPts val="1100"/>
+              <a:buFont typeface="Wingdings" panose="05000000000000000000" pitchFamily="2" charset="2"/>
+              <a:buChar char="q"/>
+            </a:pPr>
+            <a:r>
+              <a:rPr lang="en-US" sz="1700" dirty="0"/>
+              <a:t>M2 training ending in </a:t>
+            </a:r>
+            <a:r>
+              <a:rPr lang="en-US" sz="1700" dirty="0" err="1"/>
+              <a:t>NaN</a:t>
+            </a:r>
+            <a:r>
+              <a:rPr lang="en-US" sz="1700" dirty="0"/>
+              <a:t> after a few epochs due to sub-parts of the loss function having wrong sign</a:t>
+            </a:r>
+          </a:p>
+          <a:p>
+            <a:pPr marL="285750" indent="-285750">
+              <a:buClr>
+                <a:schemeClr val="dk1"/>
+              </a:buClr>
+              <a:buSzPts val="1100"/>
+              <a:buFont typeface="Wingdings" panose="05000000000000000000" pitchFamily="2" charset="2"/>
+              <a:buChar char="q"/>
+            </a:pPr>
+            <a:r>
+              <a:rPr lang="en-US" sz="1700" dirty="0"/>
+              <a:t>Applying </a:t>
+            </a:r>
+            <a:r>
+              <a:rPr lang="en-US" sz="1700" dirty="0" err="1"/>
+              <a:t>softmax</a:t>
+            </a:r>
+            <a:r>
+              <a:rPr lang="en-US" sz="1700" dirty="0"/>
+              <a:t>() along wrong dimension</a:t>
+            </a:r>
+          </a:p>
+          <a:p>
+            <a:pPr marL="285750" indent="-285750">
+              <a:buClr>
+                <a:schemeClr val="dk1"/>
+              </a:buClr>
+              <a:buSzPts val="1100"/>
+              <a:buFont typeface="Wingdings" panose="05000000000000000000" pitchFamily="2" charset="2"/>
+              <a:buChar char="q"/>
+            </a:pPr>
+            <a:r>
+              <a:rPr lang="en-US" sz="1700" dirty="0"/>
+              <a:t>M1 encoder weights were not frozen during classifier training.</a:t>
+            </a:r>
+          </a:p>
+          <a:p>
+            <a:pPr marL="285750" indent="-285750">
+              <a:buClr>
+                <a:schemeClr val="dk1"/>
+              </a:buClr>
+              <a:buSzPts val="1100"/>
+              <a:buFont typeface="Wingdings" panose="05000000000000000000" pitchFamily="2" charset="2"/>
+              <a:buChar char="q"/>
+            </a:pPr>
+            <a:r>
+              <a:rPr lang="en-US" sz="1700" dirty="0"/>
+              <a:t>Getting too good classifier results because, because a fresh set of labelled training set were wrongly introduced when doing an incremental training.</a:t>
+            </a:r>
+          </a:p>
+          <a:p>
+            <a:pPr>
+              <a:buClr>
+                <a:schemeClr val="dk1"/>
+              </a:buClr>
+              <a:buSzPts val="1100"/>
+            </a:pPr>
+            <a:endParaRPr lang="en-US" sz="1700" dirty="0"/>
+          </a:p>
+          <a:p>
+            <a:pPr>
+              <a:buClr>
+                <a:schemeClr val="dk1"/>
+              </a:buClr>
+              <a:buSzPts val="1100"/>
+            </a:pPr>
+            <a:r>
+              <a:rPr lang="en-US" sz="1700" dirty="0"/>
+              <a:t>But there was also high-points. The initial working M2 was only giving 78% accuracy with 100/40k training, not much better than 73% from FF. However, adjusting the alpha weight between the un-labelled loss and labelled loss gave an unexpected large improvement.</a:t>
+            </a:r>
+          </a:p>
+          <a:p>
+            <a:pPr>
+              <a:buClr>
+                <a:schemeClr val="dk1"/>
+              </a:buClr>
+              <a:buSzPts val="1100"/>
+            </a:pPr>
+            <a:endParaRPr lang="en-US" sz="1700" dirty="0"/>
+          </a:p>
+        </p:txBody>
+      </p:sp>
     </p:spTree>
   </p:cSld>
   <p:clrMapOvr>

</xml_diff>

<commit_message>
Updated with more clear description what we think was reason for large M2 classification improvement.
</commit_message>
<xml_diff>
--- a/poster/uffe_axel_vae_poster.ppt.pptx
+++ b/poster/uffe_axel_vae_poster.ppt.pptx
@@ -11,7 +11,7 @@
     <p:sldId id="256" r:id="rId2"/>
   </p:sldIdLst>
   <p:sldSz cx="30275213" cy="21383625"/>
-  <p:notesSz cx="9928225" cy="6797675"/>
+  <p:notesSz cx="9601200" cy="7315200"/>
   <p:defaultTextStyle>
     <a:defPPr marR="0" lvl="0" algn="l" rtl="0">
       <a:lnSpc>
@@ -294,8 +294,8 @@
         </p:nvSpPr>
         <p:spPr>
           <a:xfrm>
-            <a:off x="0" y="0"/>
-            <a:ext cx="4300537" cy="339725"/>
+            <a:off x="0" y="1"/>
+            <a:ext cx="4158882" cy="365589"/>
           </a:xfrm>
           <a:prstGeom prst="rect">
             <a:avLst/>
@@ -452,8 +452,8 @@
         </p:nvSpPr>
         <p:spPr>
           <a:xfrm>
-            <a:off x="5622925" y="0"/>
-            <a:ext cx="4303712" cy="339725"/>
+            <a:off x="5437712" y="1"/>
+            <a:ext cx="4161952" cy="365589"/>
           </a:xfrm>
           <a:prstGeom prst="rect">
             <a:avLst/>
@@ -610,8 +610,8 @@
         </p:nvSpPr>
         <p:spPr>
           <a:xfrm>
-            <a:off x="3162300" y="509588"/>
-            <a:ext cx="3605213" cy="2547937"/>
+            <a:off x="2860675" y="547688"/>
+            <a:ext cx="3881438" cy="2743200"/>
           </a:xfrm>
           <a:custGeom>
             <a:avLst/>
@@ -661,8 +661,8 @@
         </p:nvSpPr>
         <p:spPr>
           <a:xfrm>
-            <a:off x="992187" y="3227387"/>
-            <a:ext cx="7943850" cy="3060700"/>
+            <a:off x="959506" y="3473097"/>
+            <a:ext cx="7682188" cy="3293719"/>
           </a:xfrm>
           <a:prstGeom prst="rect">
             <a:avLst/>
@@ -792,8 +792,8 @@
         </p:nvSpPr>
         <p:spPr>
           <a:xfrm>
-            <a:off x="0" y="6456362"/>
-            <a:ext cx="4300537" cy="339725"/>
+            <a:off x="0" y="6947903"/>
+            <a:ext cx="4158882" cy="365589"/>
           </a:xfrm>
           <a:prstGeom prst="rect">
             <a:avLst/>
@@ -950,8 +950,8 @@
         </p:nvSpPr>
         <p:spPr>
           <a:xfrm>
-            <a:off x="5622925" y="6456362"/>
-            <a:ext cx="4303712" cy="339725"/>
+            <a:off x="5437712" y="6947903"/>
+            <a:ext cx="4161952" cy="365589"/>
           </a:xfrm>
           <a:prstGeom prst="rect">
             <a:avLst/>
@@ -1259,8 +1259,8 @@
         </p:nvSpPr>
         <p:spPr>
           <a:xfrm>
-            <a:off x="5622925" y="6456362"/>
-            <a:ext cx="4303712" cy="339725"/>
+            <a:off x="5437712" y="6947903"/>
+            <a:ext cx="4161952" cy="365589"/>
           </a:xfrm>
           <a:prstGeom prst="rect">
             <a:avLst/>
@@ -1320,8 +1320,8 @@
         </p:nvSpPr>
         <p:spPr>
           <a:xfrm>
-            <a:off x="3162300" y="509588"/>
-            <a:ext cx="3605213" cy="2547937"/>
+            <a:off x="2860675" y="547688"/>
+            <a:ext cx="3881438" cy="2743200"/>
           </a:xfrm>
           <a:custGeom>
             <a:avLst/>
@@ -1365,8 +1365,8 @@
         </p:nvSpPr>
         <p:spPr>
           <a:xfrm>
-            <a:off x="992187" y="3227387"/>
-            <a:ext cx="7943850" cy="3060700"/>
+            <a:off x="959506" y="3473097"/>
+            <a:ext cx="7682188" cy="3293719"/>
           </a:xfrm>
           <a:prstGeom prst="rect">
             <a:avLst/>
@@ -12858,7 +12858,7 @@
         </p:nvSpPr>
         <p:spPr>
           <a:xfrm>
-            <a:off x="12746628" y="8235636"/>
+            <a:off x="12712054" y="7891836"/>
             <a:ext cx="4587825" cy="650333"/>
           </a:xfrm>
           <a:prstGeom prst="rect">
@@ -14470,8 +14470,8 @@
         </p:nvSpPr>
         <p:spPr>
           <a:xfrm>
-            <a:off x="9401775" y="9172708"/>
-            <a:ext cx="10120695" cy="5324535"/>
+            <a:off x="9367201" y="8828908"/>
+            <a:ext cx="10120695" cy="6370975"/>
           </a:xfrm>
           <a:prstGeom prst="rect">
             <a:avLst/>
@@ -14492,6 +14492,63 @@
             <a:r>
               <a:rPr lang="en-US" sz="1700" dirty="0"/>
               <a:t>With just 100 labelled training data, and 40k unlabeled, we achieved 94% accuracy on the MNIST test set using the M2 VAE classifier, and thus substantially beating an FF classifier having the same size of weights, which could only achieve 73% accuracy.</a:t>
+            </a:r>
+          </a:p>
+          <a:p>
+            <a:pPr>
+              <a:buClr>
+                <a:schemeClr val="dk1"/>
+              </a:buClr>
+              <a:buSzPts val="1100"/>
+            </a:pPr>
+            <a:endParaRPr lang="en-US" sz="1700" dirty="0"/>
+          </a:p>
+          <a:p>
+            <a:pPr>
+              <a:buClr>
+                <a:schemeClr val="dk1"/>
+              </a:buClr>
+              <a:buSzPts val="1100"/>
+            </a:pPr>
+            <a:r>
+              <a:rPr lang="en-US" sz="1700" dirty="0"/>
+              <a:t>The initial functional M2 was only giving 78% accuracy with 100/40k training, not much better than 73% from FF. Two changes were made giving a large improvement:</a:t>
+            </a:r>
+          </a:p>
+          <a:p>
+            <a:pPr marL="285750" indent="-285750">
+              <a:buClr>
+                <a:schemeClr val="dk1"/>
+              </a:buClr>
+              <a:buSzPts val="1100"/>
+              <a:buFont typeface="Wingdings" panose="05000000000000000000" pitchFamily="2" charset="2"/>
+              <a:buChar char="q"/>
+            </a:pPr>
+            <a:r>
+              <a:rPr lang="en-US" sz="1700" dirty="0"/>
+              <a:t>Changing the alpha coefficient, which weights the labelled classifier loss. It was initially 0.1, which is the value used </a:t>
+            </a:r>
+            <a:r>
+              <a:rPr lang="en-US" sz="1700" dirty="0" err="1"/>
+              <a:t>Kingma</a:t>
+            </a:r>
+            <a:r>
+              <a:rPr lang="en-US" sz="1700" dirty="0"/>
+              <a:t> in [1], and we changed it to 0.5</a:t>
+            </a:r>
+          </a:p>
+          <a:p>
+            <a:pPr marL="285750" indent="-285750">
+              <a:buClr>
+                <a:schemeClr val="dk1"/>
+              </a:buClr>
+              <a:buSzPts val="1100"/>
+              <a:buFont typeface="Wingdings" panose="05000000000000000000" pitchFamily="2" charset="2"/>
+              <a:buChar char="q"/>
+            </a:pPr>
+            <a:r>
+              <a:rPr lang="en-US" sz="1700" dirty="0"/>
+              <a:t>Making a forward pass with both labelled and unlabeled training data, before doing a back prop &amp; coefficient update, instead of having a separate backward pass for labelled and for unlabeled.</a:t>
             </a:r>
           </a:p>
           <a:p>
@@ -14659,18 +14716,6 @@
               <a:buSzPts val="1100"/>
             </a:pPr>
             <a:endParaRPr lang="en-US" sz="1700" dirty="0"/>
-          </a:p>
-          <a:p>
-            <a:pPr>
-              <a:buClr>
-                <a:schemeClr val="dk1"/>
-              </a:buClr>
-              <a:buSzPts val="1100"/>
-            </a:pPr>
-            <a:r>
-              <a:rPr lang="en-US" sz="1700" dirty="0"/>
-              <a:t>But there was also high-points. The initial working M2 was only giving 78% accuracy with 100/40k training, not much better than 73% from FF. However, adjusting the alpha weight between the un-labelled loss and labelled loss gave an unexpected large improvement.</a:t>
-            </a:r>
           </a:p>
           <a:p>
             <a:pPr>

</xml_diff>